<commit_message>
add test3 and pandas_datareader
</commit_message>
<xml_diff>
--- a/Подготовка к практическим работам.pptx
+++ b/Подготовка к практическим работам.pptx
@@ -37,6 +37,10 @@
     <p:sldId id="290" r:id="rId31"/>
     <p:sldId id="292" r:id="rId32"/>
     <p:sldId id="291" r:id="rId33"/>
+    <p:sldId id="293" r:id="rId34"/>
+    <p:sldId id="294" r:id="rId35"/>
+    <p:sldId id="296" r:id="rId36"/>
+    <p:sldId id="295" r:id="rId37"/>
   </p:sldIdLst>
   <p:sldSz cx="12192000" cy="6858000"/>
   <p:notesSz cx="6858000" cy="9144000"/>
@@ -9933,13 +9937,8 @@
           <a:p>
             <a:r>
               <a:rPr lang="ru-RU" dirty="0"/>
-              <a:t>4 – график (в примере – </a:t>
-            </a:r>
-            <a:r>
-              <a:rPr lang="ru-RU"/>
-              <a:t>отдельное окно)</a:t>
-            </a:r>
-            <a:endParaRPr lang="ru-RU" dirty="0"/>
+              <a:t>4 – график (в примере – отдельное окно)</a:t>
+            </a:r>
           </a:p>
         </p:txBody>
       </p:sp>
@@ -9947,6 +9946,834 @@
     <p:extLst>
       <p:ext uri="{BB962C8B-B14F-4D97-AF65-F5344CB8AC3E}">
         <p14:creationId xmlns:p14="http://schemas.microsoft.com/office/powerpoint/2010/main" val="638713592"/>
+      </p:ext>
+    </p:extLst>
+  </p:cSld>
+  <p:clrMapOvr>
+    <a:masterClrMapping/>
+  </p:clrMapOvr>
+</p:sld>
+</file>
+
+<file path=ppt/slides/slide33.xml><?xml version="1.0" encoding="utf-8"?>
+<p:sld xmlns:a="http://schemas.openxmlformats.org/drawingml/2006/main" xmlns:r="http://schemas.openxmlformats.org/officeDocument/2006/relationships" xmlns:p="http://schemas.openxmlformats.org/presentationml/2006/main">
+  <p:cSld>
+    <p:spTree>
+      <p:nvGrpSpPr>
+        <p:cNvPr id="1" name=""/>
+        <p:cNvGrpSpPr/>
+        <p:nvPr/>
+      </p:nvGrpSpPr>
+      <p:grpSpPr>
+        <a:xfrm>
+          <a:off x="0" y="0"/>
+          <a:ext cx="0" cy="0"/>
+          <a:chOff x="0" y="0"/>
+          <a:chExt cx="0" cy="0"/>
+        </a:xfrm>
+      </p:grpSpPr>
+      <p:sp>
+        <p:nvSpPr>
+          <p:cNvPr id="4" name="Заголовок 3">
+            <a:extLst>
+              <a:ext uri="{FF2B5EF4-FFF2-40B4-BE49-F238E27FC236}">
+                <a16:creationId xmlns:a16="http://schemas.microsoft.com/office/drawing/2014/main" id="{18A9C440-44CA-484B-B74A-063384EFC3B1}"/>
+              </a:ext>
+            </a:extLst>
+          </p:cNvPr>
+          <p:cNvSpPr>
+            <a:spLocks noGrp="1"/>
+          </p:cNvSpPr>
+          <p:nvPr>
+            <p:ph type="title"/>
+          </p:nvPr>
+        </p:nvSpPr>
+        <p:spPr/>
+        <p:txBody>
+          <a:bodyPr/>
+          <a:lstStyle/>
+          <a:p>
+            <a:r>
+              <a:rPr lang="ru-RU" dirty="0"/>
+              <a:t>Заготовки к последующим работам</a:t>
+            </a:r>
+          </a:p>
+        </p:txBody>
+      </p:sp>
+      <p:sp>
+        <p:nvSpPr>
+          <p:cNvPr id="5" name="Текст 4">
+            <a:extLst>
+              <a:ext uri="{FF2B5EF4-FFF2-40B4-BE49-F238E27FC236}">
+                <a16:creationId xmlns:a16="http://schemas.microsoft.com/office/drawing/2014/main" id="{CD366F20-270A-4766-8E20-BF0EDFAF1BF8}"/>
+              </a:ext>
+            </a:extLst>
+          </p:cNvPr>
+          <p:cNvSpPr>
+            <a:spLocks noGrp="1"/>
+          </p:cNvSpPr>
+          <p:nvPr>
+            <p:ph type="body" idx="1"/>
+          </p:nvPr>
+        </p:nvSpPr>
+        <p:spPr/>
+        <p:txBody>
+          <a:bodyPr/>
+          <a:lstStyle/>
+          <a:p>
+            <a:endParaRPr lang="ru-RU"/>
+          </a:p>
+        </p:txBody>
+      </p:sp>
+    </p:spTree>
+    <p:extLst>
+      <p:ext uri="{BB962C8B-B14F-4D97-AF65-F5344CB8AC3E}">
+        <p14:creationId xmlns:p14="http://schemas.microsoft.com/office/powerpoint/2010/main" val="1764934362"/>
+      </p:ext>
+    </p:extLst>
+  </p:cSld>
+  <p:clrMapOvr>
+    <a:masterClrMapping/>
+  </p:clrMapOvr>
+</p:sld>
+</file>
+
+<file path=ppt/slides/slide34.xml><?xml version="1.0" encoding="utf-8"?>
+<p:sld xmlns:a="http://schemas.openxmlformats.org/drawingml/2006/main" xmlns:r="http://schemas.openxmlformats.org/officeDocument/2006/relationships" xmlns:p="http://schemas.openxmlformats.org/presentationml/2006/main">
+  <p:cSld>
+    <p:spTree>
+      <p:nvGrpSpPr>
+        <p:cNvPr id="1" name=""/>
+        <p:cNvGrpSpPr/>
+        <p:nvPr/>
+      </p:nvGrpSpPr>
+      <p:grpSpPr>
+        <a:xfrm>
+          <a:off x="0" y="0"/>
+          <a:ext cx="0" cy="0"/>
+          <a:chOff x="0" y="0"/>
+          <a:chExt cx="0" cy="0"/>
+        </a:xfrm>
+      </p:grpSpPr>
+      <p:sp>
+        <p:nvSpPr>
+          <p:cNvPr id="4" name="Заголовок 3">
+            <a:extLst>
+              <a:ext uri="{FF2B5EF4-FFF2-40B4-BE49-F238E27FC236}">
+                <a16:creationId xmlns:a16="http://schemas.microsoft.com/office/drawing/2014/main" id="{A2F58448-D967-4F85-BB8C-3D60C72534E7}"/>
+              </a:ext>
+            </a:extLst>
+          </p:cNvPr>
+          <p:cNvSpPr>
+            <a:spLocks noGrp="1"/>
+          </p:cNvSpPr>
+          <p:nvPr>
+            <p:ph type="title"/>
+          </p:nvPr>
+        </p:nvSpPr>
+        <p:spPr/>
+        <p:txBody>
+          <a:bodyPr/>
+          <a:lstStyle/>
+          <a:p>
+            <a:endParaRPr lang="ru-RU"/>
+          </a:p>
+        </p:txBody>
+      </p:sp>
+      <p:sp>
+        <p:nvSpPr>
+          <p:cNvPr id="5" name="Объект 4">
+            <a:extLst>
+              <a:ext uri="{FF2B5EF4-FFF2-40B4-BE49-F238E27FC236}">
+                <a16:creationId xmlns:a16="http://schemas.microsoft.com/office/drawing/2014/main" id="{42133CAB-AEE2-41D3-8F5D-C3CB646384DA}"/>
+              </a:ext>
+            </a:extLst>
+          </p:cNvPr>
+          <p:cNvSpPr>
+            <a:spLocks noGrp="1"/>
+          </p:cNvSpPr>
+          <p:nvPr>
+            <p:ph idx="1"/>
+          </p:nvPr>
+        </p:nvSpPr>
+        <p:spPr>
+          <a:xfrm>
+            <a:off x="179957" y="1394989"/>
+            <a:ext cx="6729802" cy="5046145"/>
+          </a:xfrm>
+        </p:spPr>
+        <p:txBody>
+          <a:bodyPr>
+            <a:normAutofit fontScale="92500"/>
+          </a:bodyPr>
+          <a:lstStyle/>
+          <a:p>
+            <a:pPr marL="457200" indent="-457200">
+              <a:buFont typeface="+mj-lt"/>
+              <a:buAutoNum type="arabicPeriod"/>
+            </a:pPr>
+            <a:r>
+              <a:rPr lang="ru-RU" dirty="0"/>
+              <a:t>Вы создали окружение, которое можно использовать в последующих проектах</a:t>
+            </a:r>
+          </a:p>
+          <a:p>
+            <a:pPr marL="457200" indent="-457200">
+              <a:buFont typeface="+mj-lt"/>
+              <a:buAutoNum type="arabicPeriod"/>
+            </a:pPr>
+            <a:r>
+              <a:rPr lang="ru-RU" dirty="0"/>
+              <a:t>Вы можете развивать текущий проект дальше, создавая новые файлы с программами и библиотеками</a:t>
+            </a:r>
+          </a:p>
+          <a:p>
+            <a:pPr marL="457200" indent="-457200">
+              <a:buFont typeface="+mj-lt"/>
+              <a:buAutoNum type="arabicPeriod"/>
+            </a:pPr>
+            <a:r>
+              <a:rPr lang="ru-RU" dirty="0"/>
+              <a:t>Откройте файл </a:t>
+            </a:r>
+            <a:r>
+              <a:rPr lang="en-US" dirty="0"/>
+              <a:t>test2 (</a:t>
+            </a:r>
+            <a:r>
+              <a:rPr lang="ru-RU" dirty="0"/>
+              <a:t>или скачайте его последнюю версию из репозитория)</a:t>
+            </a:r>
+          </a:p>
+          <a:p>
+            <a:pPr marL="908050" lvl="1" indent="-457200">
+              <a:buFont typeface="+mj-lt"/>
+              <a:buAutoNum type="arabicPeriod"/>
+            </a:pPr>
+            <a:r>
+              <a:rPr lang="ru-RU" dirty="0"/>
+              <a:t>Этот файл содержит типичный заголовок, в котором подключены модули для анализа данных</a:t>
+            </a:r>
+          </a:p>
+          <a:p>
+            <a:pPr marL="908050" lvl="1" indent="-457200">
+              <a:buFont typeface="+mj-lt"/>
+              <a:buAutoNum type="arabicPeriod"/>
+            </a:pPr>
+            <a:r>
+              <a:rPr lang="ru-RU" dirty="0"/>
+              <a:t>Сохраните его как шаблон для последующего старта</a:t>
+            </a:r>
+            <a:endParaRPr lang="en-US" dirty="0"/>
+          </a:p>
+          <a:p>
+            <a:pPr marL="908050" lvl="1" indent="-457200">
+              <a:buFont typeface="+mj-lt"/>
+              <a:buAutoNum type="arabicPeriod"/>
+            </a:pPr>
+            <a:r>
+              <a:rPr lang="ru-RU" dirty="0"/>
+              <a:t>Теперь вы можете выбирать </a:t>
+            </a:r>
+            <a:r>
+              <a:rPr lang="en-US" dirty="0"/>
+              <a:t>test3 </a:t>
+            </a:r>
+            <a:r>
+              <a:rPr lang="ru-RU" dirty="0"/>
+              <a:t>из списка новых фалов</a:t>
+            </a:r>
+          </a:p>
+        </p:txBody>
+      </p:sp>
+      <p:pic>
+        <p:nvPicPr>
+          <p:cNvPr id="1026" name="Picture 2">
+            <a:extLst>
+              <a:ext uri="{FF2B5EF4-FFF2-40B4-BE49-F238E27FC236}">
+                <a16:creationId xmlns:a16="http://schemas.microsoft.com/office/drawing/2014/main" id="{EE035205-F044-49D4-985A-9A072B0FCBAA}"/>
+              </a:ext>
+            </a:extLst>
+          </p:cNvPr>
+          <p:cNvPicPr>
+            <a:picLocks noChangeAspect="1" noChangeArrowheads="1"/>
+          </p:cNvPicPr>
+          <p:nvPr/>
+        </p:nvPicPr>
+        <p:blipFill>
+          <a:blip r:embed="rId2">
+            <a:extLst>
+              <a:ext uri="{28A0092B-C50C-407E-A947-70E740481C1C}">
+                <a14:useLocalDpi xmlns:a14="http://schemas.microsoft.com/office/drawing/2010/main" val="0"/>
+              </a:ext>
+            </a:extLst>
+          </a:blip>
+          <a:srcRect/>
+          <a:stretch>
+            <a:fillRect/>
+          </a:stretch>
+        </p:blipFill>
+        <p:spPr bwMode="auto">
+          <a:xfrm>
+            <a:off x="6247861" y="164592"/>
+            <a:ext cx="5857875" cy="3067050"/>
+          </a:xfrm>
+          <a:prstGeom prst="rect">
+            <a:avLst/>
+          </a:prstGeom>
+          <a:ln>
+            <a:noFill/>
+          </a:ln>
+          <a:effectLst>
+            <a:outerShdw blurRad="190500" algn="tl" rotWithShape="0">
+              <a:srgbClr val="000000">
+                <a:alpha val="70000"/>
+              </a:srgbClr>
+            </a:outerShdw>
+          </a:effectLst>
+          <a:extLst>
+            <a:ext uri="{909E8E84-426E-40DD-AFC4-6F175D3DCCD1}">
+              <a14:hiddenFill xmlns:a14="http://schemas.microsoft.com/office/drawing/2010/main">
+                <a:solidFill>
+                  <a:srgbClr val="FFFFFF"/>
+                </a:solidFill>
+              </a14:hiddenFill>
+            </a:ext>
+          </a:extLst>
+        </p:spPr>
+      </p:pic>
+    </p:spTree>
+    <p:extLst>
+      <p:ext uri="{BB962C8B-B14F-4D97-AF65-F5344CB8AC3E}">
+        <p14:creationId xmlns:p14="http://schemas.microsoft.com/office/powerpoint/2010/main" val="3570023288"/>
+      </p:ext>
+    </p:extLst>
+  </p:cSld>
+  <p:clrMapOvr>
+    <a:masterClrMapping/>
+  </p:clrMapOvr>
+</p:sld>
+</file>
+
+<file path=ppt/slides/slide35.xml><?xml version="1.0" encoding="utf-8"?>
+<p:sld xmlns:a="http://schemas.openxmlformats.org/drawingml/2006/main" xmlns:r="http://schemas.openxmlformats.org/officeDocument/2006/relationships" xmlns:p="http://schemas.openxmlformats.org/presentationml/2006/main">
+  <p:cSld>
+    <p:spTree>
+      <p:nvGrpSpPr>
+        <p:cNvPr id="1" name=""/>
+        <p:cNvGrpSpPr/>
+        <p:nvPr/>
+      </p:nvGrpSpPr>
+      <p:grpSpPr>
+        <a:xfrm>
+          <a:off x="0" y="0"/>
+          <a:ext cx="0" cy="0"/>
+          <a:chOff x="0" y="0"/>
+          <a:chExt cx="0" cy="0"/>
+        </a:xfrm>
+      </p:grpSpPr>
+      <p:sp>
+        <p:nvSpPr>
+          <p:cNvPr id="4" name="Заголовок 3">
+            <a:extLst>
+              <a:ext uri="{FF2B5EF4-FFF2-40B4-BE49-F238E27FC236}">
+                <a16:creationId xmlns:a16="http://schemas.microsoft.com/office/drawing/2014/main" id="{59CA884E-2659-4FD3-9B78-F5E166F989DC}"/>
+              </a:ext>
+            </a:extLst>
+          </p:cNvPr>
+          <p:cNvSpPr>
+            <a:spLocks noGrp="1"/>
+          </p:cNvSpPr>
+          <p:nvPr>
+            <p:ph type="title"/>
+          </p:nvPr>
+        </p:nvSpPr>
+        <p:spPr/>
+        <p:txBody>
+          <a:bodyPr/>
+          <a:lstStyle/>
+          <a:p>
+            <a:r>
+              <a:rPr lang="ru-RU" dirty="0"/>
+              <a:t>Самостоятельная работа по теме</a:t>
+            </a:r>
+          </a:p>
+        </p:txBody>
+      </p:sp>
+      <p:sp>
+        <p:nvSpPr>
+          <p:cNvPr id="5" name="Текст 4">
+            <a:extLst>
+              <a:ext uri="{FF2B5EF4-FFF2-40B4-BE49-F238E27FC236}">
+                <a16:creationId xmlns:a16="http://schemas.microsoft.com/office/drawing/2014/main" id="{103BE9DA-8797-4C51-B9F3-7DFC80B3F19F}"/>
+              </a:ext>
+            </a:extLst>
+          </p:cNvPr>
+          <p:cNvSpPr>
+            <a:spLocks noGrp="1"/>
+          </p:cNvSpPr>
+          <p:nvPr>
+            <p:ph type="body" idx="1"/>
+          </p:nvPr>
+        </p:nvSpPr>
+        <p:spPr/>
+        <p:txBody>
+          <a:bodyPr/>
+          <a:lstStyle/>
+          <a:p>
+            <a:endParaRPr lang="ru-RU"/>
+          </a:p>
+        </p:txBody>
+      </p:sp>
+    </p:spTree>
+    <p:extLst>
+      <p:ext uri="{BB962C8B-B14F-4D97-AF65-F5344CB8AC3E}">
+        <p14:creationId xmlns:p14="http://schemas.microsoft.com/office/powerpoint/2010/main" val="1572502071"/>
+      </p:ext>
+    </p:extLst>
+  </p:cSld>
+  <p:clrMapOvr>
+    <a:masterClrMapping/>
+  </p:clrMapOvr>
+</p:sld>
+</file>
+
+<file path=ppt/slides/slide36.xml><?xml version="1.0" encoding="utf-8"?>
+<p:sld xmlns:a="http://schemas.openxmlformats.org/drawingml/2006/main" xmlns:r="http://schemas.openxmlformats.org/officeDocument/2006/relationships" xmlns:p="http://schemas.openxmlformats.org/presentationml/2006/main">
+  <p:cSld>
+    <p:spTree>
+      <p:nvGrpSpPr>
+        <p:cNvPr id="1" name=""/>
+        <p:cNvGrpSpPr/>
+        <p:nvPr/>
+      </p:nvGrpSpPr>
+      <p:grpSpPr>
+        <a:xfrm>
+          <a:off x="0" y="0"/>
+          <a:ext cx="0" cy="0"/>
+          <a:chOff x="0" y="0"/>
+          <a:chExt cx="0" cy="0"/>
+        </a:xfrm>
+      </p:grpSpPr>
+      <p:sp>
+        <p:nvSpPr>
+          <p:cNvPr id="2" name="Заголовок 1">
+            <a:extLst>
+              <a:ext uri="{FF2B5EF4-FFF2-40B4-BE49-F238E27FC236}">
+                <a16:creationId xmlns:a16="http://schemas.microsoft.com/office/drawing/2014/main" id="{596B2AD5-AC27-433D-A6C0-6045E055FA6D}"/>
+              </a:ext>
+            </a:extLst>
+          </p:cNvPr>
+          <p:cNvSpPr>
+            <a:spLocks noGrp="1"/>
+          </p:cNvSpPr>
+          <p:nvPr>
+            <p:ph type="title"/>
+          </p:nvPr>
+        </p:nvSpPr>
+        <p:spPr/>
+        <p:txBody>
+          <a:bodyPr/>
+          <a:lstStyle/>
+          <a:p>
+            <a:r>
+              <a:rPr lang="en-US" dirty="0"/>
+              <a:t>https://data.worldbank.org/</a:t>
+            </a:r>
+            <a:endParaRPr lang="ru-RU" dirty="0"/>
+          </a:p>
+        </p:txBody>
+      </p:sp>
+      <p:sp>
+        <p:nvSpPr>
+          <p:cNvPr id="3" name="Объект 2">
+            <a:extLst>
+              <a:ext uri="{FF2B5EF4-FFF2-40B4-BE49-F238E27FC236}">
+                <a16:creationId xmlns:a16="http://schemas.microsoft.com/office/drawing/2014/main" id="{82A66A85-3313-449D-966C-6F30FC550EEC}"/>
+              </a:ext>
+            </a:extLst>
+          </p:cNvPr>
+          <p:cNvSpPr>
+            <a:spLocks noGrp="1"/>
+          </p:cNvSpPr>
+          <p:nvPr>
+            <p:ph idx="1"/>
+          </p:nvPr>
+        </p:nvSpPr>
+        <p:spPr/>
+        <p:txBody>
+          <a:bodyPr/>
+          <a:lstStyle/>
+          <a:p>
+            <a:r>
+              <a:rPr lang="ru-RU" dirty="0"/>
+              <a:t>Мировой банк предоставляет открытый доступ к ряду экономических показателей</a:t>
+            </a:r>
+          </a:p>
+          <a:p>
+            <a:r>
+              <a:rPr lang="ru-RU" dirty="0"/>
+              <a:t>Для чтения данных из удаленных источников можно использовать модуль </a:t>
+            </a:r>
+            <a:endParaRPr lang="en-US" dirty="0"/>
+          </a:p>
+          <a:p>
+            <a:pPr lvl="1"/>
+            <a:r>
+              <a:rPr lang="en-US" dirty="0" err="1"/>
+              <a:t>Pandas_datareader</a:t>
+            </a:r>
+            <a:endParaRPr lang="en-US" dirty="0"/>
+          </a:p>
+          <a:p>
+            <a:r>
+              <a:rPr lang="ru-RU" dirty="0"/>
+              <a:t>Самостоятельно установите указанный модуль в окружение</a:t>
+            </a:r>
+          </a:p>
+          <a:p>
+            <a:r>
+              <a:rPr lang="ru-RU" dirty="0"/>
+              <a:t>Запустите программу </a:t>
+            </a:r>
+            <a:r>
+              <a:rPr lang="en-US" dirty="0"/>
+              <a:t>test3.py (</a:t>
+            </a:r>
+            <a:r>
+              <a:rPr lang="ru-RU" dirty="0"/>
+              <a:t>загрузите ее текст из репозитория)</a:t>
+            </a:r>
+          </a:p>
+          <a:p>
+            <a:r>
+              <a:rPr lang="ru-RU" dirty="0"/>
+              <a:t>Проверьте результаты</a:t>
+            </a:r>
+          </a:p>
+          <a:p>
+            <a:r>
+              <a:rPr lang="ru-RU" dirty="0"/>
+              <a:t>Время доступа к данным может </a:t>
+            </a:r>
+            <a:r>
+              <a:rPr lang="ru-RU"/>
+              <a:t>быть значительным (3-5 минут)</a:t>
+            </a:r>
+            <a:endParaRPr lang="ru-RU" dirty="0"/>
+          </a:p>
+        </p:txBody>
+      </p:sp>
+      <p:sp>
+        <p:nvSpPr>
+          <p:cNvPr id="4" name="Rectangle 1">
+            <a:extLst>
+              <a:ext uri="{FF2B5EF4-FFF2-40B4-BE49-F238E27FC236}">
+                <a16:creationId xmlns:a16="http://schemas.microsoft.com/office/drawing/2014/main" id="{7D90DBA2-5A35-4B28-83D3-E72223591043}"/>
+              </a:ext>
+            </a:extLst>
+          </p:cNvPr>
+          <p:cNvSpPr>
+            <a:spLocks noChangeArrowheads="1"/>
+          </p:cNvSpPr>
+          <p:nvPr/>
+        </p:nvSpPr>
+        <p:spPr bwMode="auto">
+          <a:xfrm>
+            <a:off x="0" y="0"/>
+            <a:ext cx="12192000" cy="457200"/>
+          </a:xfrm>
+          <a:prstGeom prst="rect">
+            <a:avLst/>
+          </a:prstGeom>
+          <a:solidFill>
+            <a:srgbClr val="FFFFFF"/>
+          </a:solidFill>
+          <a:ln>
+            <a:noFill/>
+          </a:ln>
+          <a:effectLst/>
+          <a:extLst>
+            <a:ext uri="{91240B29-F687-4F45-9708-019B960494DF}">
+              <a14:hiddenLine xmlns:a14="http://schemas.microsoft.com/office/drawing/2010/main" w="9525">
+                <a:solidFill>
+                  <a:schemeClr val="tx1"/>
+                </a:solidFill>
+                <a:miter lim="800000"/>
+                <a:headEnd/>
+                <a:tailEnd/>
+              </a14:hiddenLine>
+            </a:ext>
+            <a:ext uri="{AF507438-7753-43E0-B8FC-AC1667EBCBE1}">
+              <a14:hiddenEffects xmlns:a14="http://schemas.microsoft.com/office/drawing/2010/main">
+                <a:effectLst>
+                  <a:outerShdw dist="35921" dir="2700000" algn="ctr" rotWithShape="0">
+                    <a:schemeClr val="bg2"/>
+                  </a:outerShdw>
+                </a:effectLst>
+              </a14:hiddenEffects>
+            </a:ext>
+          </a:extLst>
+        </p:spPr>
+        <p:txBody>
+          <a:bodyPr vert="horz" wrap="none" lIns="91440" tIns="45720" rIns="91440" bIns="45720" numCol="1" anchor="ctr" anchorCtr="0" compatLnSpc="1">
+            <a:prstTxWarp prst="textNoShape">
+              <a:avLst/>
+            </a:prstTxWarp>
+            <a:spAutoFit/>
+          </a:bodyPr>
+          <a:lstStyle/>
+          <a:p>
+            <a:pPr marL="0" marR="0" lvl="0" indent="0" algn="l" defTabSz="914400" rtl="0" eaLnBrk="0" fontAlgn="base" latinLnBrk="0" hangingPunct="0">
+              <a:lnSpc>
+                <a:spcPct val="100000"/>
+              </a:lnSpc>
+              <a:spcBef>
+                <a:spcPct val="0"/>
+              </a:spcBef>
+              <a:spcAft>
+                <a:spcPct val="0"/>
+              </a:spcAft>
+              <a:buClrTx/>
+              <a:buSzTx/>
+              <a:buFontTx/>
+              <a:buNone/>
+              <a:tabLst/>
+            </a:pPr>
+            <a:r>
+              <a:rPr kumimoji="0" lang="ru-RU" altLang="ru-RU" sz="1000" b="0" i="0" u="none" strike="noStrike" cap="none" normalizeH="0" baseline="0">
+                <a:ln>
+                  <a:noFill/>
+                </a:ln>
+                <a:solidFill>
+                  <a:srgbClr val="000000"/>
+                </a:solidFill>
+                <a:effectLst/>
+                <a:latin typeface="Consolas" panose="020B0609020204030204" pitchFamily="49" charset="0"/>
+              </a:rPr>
+              <a:t>pandas_datareader</a:t>
+            </a:r>
+            <a:endParaRPr kumimoji="0" lang="ru-RU" altLang="ru-RU" sz="1800" b="0" i="0" u="none" strike="noStrike" cap="none" normalizeH="0" baseline="0">
+              <a:ln>
+                <a:noFill/>
+              </a:ln>
+              <a:solidFill>
+                <a:schemeClr val="tx1"/>
+              </a:solidFill>
+              <a:effectLst/>
+              <a:latin typeface="Arial" panose="020B0604020202020204" pitchFamily="34" charset="0"/>
+            </a:endParaRPr>
+          </a:p>
+        </p:txBody>
+      </p:sp>
+      <p:sp>
+        <p:nvSpPr>
+          <p:cNvPr id="5" name="Rectangle 2">
+            <a:extLst>
+              <a:ext uri="{FF2B5EF4-FFF2-40B4-BE49-F238E27FC236}">
+                <a16:creationId xmlns:a16="http://schemas.microsoft.com/office/drawing/2014/main" id="{F490F717-3A0C-4E8A-94D4-DDC13655745C}"/>
+              </a:ext>
+            </a:extLst>
+          </p:cNvPr>
+          <p:cNvSpPr>
+            <a:spLocks noChangeArrowheads="1"/>
+          </p:cNvSpPr>
+          <p:nvPr/>
+        </p:nvSpPr>
+        <p:spPr bwMode="auto">
+          <a:xfrm>
+            <a:off x="152400" y="152400"/>
+            <a:ext cx="12192000" cy="457200"/>
+          </a:xfrm>
+          <a:prstGeom prst="rect">
+            <a:avLst/>
+          </a:prstGeom>
+          <a:solidFill>
+            <a:srgbClr val="FFFFFF"/>
+          </a:solidFill>
+          <a:ln>
+            <a:noFill/>
+          </a:ln>
+          <a:effectLst/>
+          <a:extLst>
+            <a:ext uri="{91240B29-F687-4F45-9708-019B960494DF}">
+              <a14:hiddenLine xmlns:a14="http://schemas.microsoft.com/office/drawing/2010/main" w="9525">
+                <a:solidFill>
+                  <a:schemeClr val="tx1"/>
+                </a:solidFill>
+                <a:miter lim="800000"/>
+                <a:headEnd/>
+                <a:tailEnd/>
+              </a14:hiddenLine>
+            </a:ext>
+            <a:ext uri="{AF507438-7753-43E0-B8FC-AC1667EBCBE1}">
+              <a14:hiddenEffects xmlns:a14="http://schemas.microsoft.com/office/drawing/2010/main">
+                <a:effectLst>
+                  <a:outerShdw dist="35921" dir="2700000" algn="ctr" rotWithShape="0">
+                    <a:schemeClr val="bg2"/>
+                  </a:outerShdw>
+                </a:effectLst>
+              </a14:hiddenEffects>
+            </a:ext>
+          </a:extLst>
+        </p:spPr>
+        <p:txBody>
+          <a:bodyPr vert="horz" wrap="none" lIns="91440" tIns="45720" rIns="91440" bIns="45720" numCol="1" anchor="ctr" anchorCtr="0" compatLnSpc="1">
+            <a:prstTxWarp prst="textNoShape">
+              <a:avLst/>
+            </a:prstTxWarp>
+            <a:spAutoFit/>
+          </a:bodyPr>
+          <a:lstStyle/>
+          <a:p>
+            <a:pPr marL="0" marR="0" lvl="0" indent="0" algn="l" defTabSz="914400" rtl="0" eaLnBrk="0" fontAlgn="base" latinLnBrk="0" hangingPunct="0">
+              <a:lnSpc>
+                <a:spcPct val="100000"/>
+              </a:lnSpc>
+              <a:spcBef>
+                <a:spcPct val="0"/>
+              </a:spcBef>
+              <a:spcAft>
+                <a:spcPct val="0"/>
+              </a:spcAft>
+              <a:buClrTx/>
+              <a:buSzTx/>
+              <a:buFontTx/>
+              <a:buNone/>
+              <a:tabLst/>
+            </a:pPr>
+            <a:r>
+              <a:rPr kumimoji="0" lang="ru-RU" altLang="ru-RU" sz="1000" b="0" i="0" u="none" strike="noStrike" cap="none" normalizeH="0" baseline="0">
+                <a:ln>
+                  <a:noFill/>
+                </a:ln>
+                <a:solidFill>
+                  <a:srgbClr val="000000"/>
+                </a:solidFill>
+                <a:effectLst/>
+                <a:latin typeface="Consolas" panose="020B0609020204030204" pitchFamily="49" charset="0"/>
+              </a:rPr>
+              <a:t>pandas_datareader</a:t>
+            </a:r>
+            <a:endParaRPr kumimoji="0" lang="ru-RU" altLang="ru-RU" sz="1800" b="0" i="0" u="none" strike="noStrike" cap="none" normalizeH="0" baseline="0">
+              <a:ln>
+                <a:noFill/>
+              </a:ln>
+              <a:solidFill>
+                <a:schemeClr val="tx1"/>
+              </a:solidFill>
+              <a:effectLst/>
+              <a:latin typeface="Arial" panose="020B0604020202020204" pitchFamily="34" charset="0"/>
+            </a:endParaRPr>
+          </a:p>
+        </p:txBody>
+      </p:sp>
+      <p:sp>
+        <p:nvSpPr>
+          <p:cNvPr id="6" name="Rectangle 3">
+            <a:extLst>
+              <a:ext uri="{FF2B5EF4-FFF2-40B4-BE49-F238E27FC236}">
+                <a16:creationId xmlns:a16="http://schemas.microsoft.com/office/drawing/2014/main" id="{BBBA8B74-A9D2-4A09-A1BB-49A1DA9159DD}"/>
+              </a:ext>
+            </a:extLst>
+          </p:cNvPr>
+          <p:cNvSpPr>
+            <a:spLocks noChangeArrowheads="1"/>
+          </p:cNvSpPr>
+          <p:nvPr/>
+        </p:nvSpPr>
+        <p:spPr bwMode="auto">
+          <a:xfrm>
+            <a:off x="304800" y="304800"/>
+            <a:ext cx="12192000" cy="457200"/>
+          </a:xfrm>
+          <a:prstGeom prst="rect">
+            <a:avLst/>
+          </a:prstGeom>
+          <a:solidFill>
+            <a:srgbClr val="FFFFFF"/>
+          </a:solidFill>
+          <a:ln>
+            <a:noFill/>
+          </a:ln>
+          <a:effectLst/>
+          <a:extLst>
+            <a:ext uri="{91240B29-F687-4F45-9708-019B960494DF}">
+              <a14:hiddenLine xmlns:a14="http://schemas.microsoft.com/office/drawing/2010/main" w="9525">
+                <a:solidFill>
+                  <a:schemeClr val="tx1"/>
+                </a:solidFill>
+                <a:miter lim="800000"/>
+                <a:headEnd/>
+                <a:tailEnd/>
+              </a14:hiddenLine>
+            </a:ext>
+            <a:ext uri="{AF507438-7753-43E0-B8FC-AC1667EBCBE1}">
+              <a14:hiddenEffects xmlns:a14="http://schemas.microsoft.com/office/drawing/2010/main">
+                <a:effectLst>
+                  <a:outerShdw dist="35921" dir="2700000" algn="ctr" rotWithShape="0">
+                    <a:schemeClr val="bg2"/>
+                  </a:outerShdw>
+                </a:effectLst>
+              </a14:hiddenEffects>
+            </a:ext>
+          </a:extLst>
+        </p:spPr>
+        <p:txBody>
+          <a:bodyPr vert="horz" wrap="none" lIns="91440" tIns="45720" rIns="91440" bIns="45720" numCol="1" anchor="ctr" anchorCtr="0" compatLnSpc="1">
+            <a:prstTxWarp prst="textNoShape">
+              <a:avLst/>
+            </a:prstTxWarp>
+            <a:spAutoFit/>
+          </a:bodyPr>
+          <a:lstStyle/>
+          <a:p>
+            <a:pPr marL="0" marR="0" lvl="0" indent="0" algn="l" defTabSz="914400" rtl="0" eaLnBrk="0" fontAlgn="base" latinLnBrk="0" hangingPunct="0">
+              <a:lnSpc>
+                <a:spcPct val="100000"/>
+              </a:lnSpc>
+              <a:spcBef>
+                <a:spcPct val="0"/>
+              </a:spcBef>
+              <a:spcAft>
+                <a:spcPct val="0"/>
+              </a:spcAft>
+              <a:buClrTx/>
+              <a:buSzTx/>
+              <a:buFontTx/>
+              <a:buNone/>
+              <a:tabLst/>
+            </a:pPr>
+            <a:r>
+              <a:rPr kumimoji="0" lang="ru-RU" altLang="ru-RU" sz="1000" b="0" i="0" u="none" strike="noStrike" cap="none" normalizeH="0" baseline="0">
+                <a:ln>
+                  <a:noFill/>
+                </a:ln>
+                <a:solidFill>
+                  <a:srgbClr val="000000"/>
+                </a:solidFill>
+                <a:effectLst/>
+                <a:latin typeface="Consolas" panose="020B0609020204030204" pitchFamily="49" charset="0"/>
+              </a:rPr>
+              <a:t>pandas_datareader</a:t>
+            </a:r>
+            <a:endParaRPr kumimoji="0" lang="ru-RU" altLang="ru-RU" sz="1800" b="0" i="0" u="none" strike="noStrike" cap="none" normalizeH="0" baseline="0">
+              <a:ln>
+                <a:noFill/>
+              </a:ln>
+              <a:solidFill>
+                <a:schemeClr val="tx1"/>
+              </a:solidFill>
+              <a:effectLst/>
+              <a:latin typeface="Arial" panose="020B0604020202020204" pitchFamily="34" charset="0"/>
+            </a:endParaRPr>
+          </a:p>
+        </p:txBody>
+      </p:sp>
+    </p:spTree>
+    <p:extLst>
+      <p:ext uri="{BB962C8B-B14F-4D97-AF65-F5344CB8AC3E}">
+        <p14:creationId xmlns:p14="http://schemas.microsoft.com/office/powerpoint/2010/main" val="1016011053"/>
       </p:ext>
     </p:extLst>
   </p:cSld>

</xml_diff>